<commit_message>
Final PPT Reading Exam
</commit_message>
<xml_diff>
--- a/ppt_reading_exam.pptx
+++ b/ppt_reading_exam.pptx
@@ -1,6 +1,6 @@
 
 <file path=ppt/presentation.xml><?xml version="1.0" encoding="utf-8"?>
-<p:presentation xmlns:a="http://schemas.openxmlformats.org/drawingml/2006/main" xmlns:r="http://schemas.openxmlformats.org/officeDocument/2006/relationships" xmlns:p="http://schemas.openxmlformats.org/presentationml/2006/main" strictFirstAndLastChars="0" saveSubsetFonts="1" autoCompressPictures="0">
+<p:presentation xmlns:a="http://schemas.openxmlformats.org/drawingml/2006/main" xmlns:r="http://schemas.openxmlformats.org/officeDocument/2006/relationships" xmlns:p="http://schemas.openxmlformats.org/presentationml/2006/main" showSpecialPlsOnTitleSld="0" strictFirstAndLastChars="0" saveSubsetFonts="1" autoCompressPictures="0">
   <p:sldMasterIdLst>
     <p:sldMasterId id="2147483658" r:id="rId1"/>
   </p:sldMasterIdLst>
@@ -2144,7 +2144,63 @@
               </a:spcBef>
               <a:buNone/>
             </a:pPr>
-            <a:endParaRPr/>
+            <a:r>
+              <a:rPr lang="en-US" dirty="0" err="1" smtClean="0"/>
+              <a:t>Crities</a:t>
+            </a:r>
+            <a:r>
+              <a:rPr lang="en-US" dirty="0" smtClean="0"/>
+              <a:t>:</a:t>
+            </a:r>
+          </a:p>
+          <a:p>
+            <a:pPr marL="228600" lvl="0" indent="-228600">
+              <a:spcBef>
+                <a:spcPts val="0"/>
+              </a:spcBef>
+              <a:buAutoNum type="arabicPeriod"/>
+            </a:pPr>
+            <a:r>
+              <a:rPr lang="en-US" dirty="0" smtClean="0"/>
+              <a:t>Semi supervised learning, by studying</a:t>
+            </a:r>
+            <a:r>
+              <a:rPr lang="en-US" baseline="0" dirty="0" smtClean="0"/>
+              <a:t> where another person goes from ur location and using it to train your models </a:t>
+            </a:r>
+          </a:p>
+          <a:p>
+            <a:pPr marL="228600" lvl="0" indent="-228600">
+              <a:spcBef>
+                <a:spcPts val="0"/>
+              </a:spcBef>
+              <a:buAutoNum type="arabicPeriod"/>
+            </a:pPr>
+            <a:r>
+              <a:rPr lang="en-US" baseline="0" dirty="0" smtClean="0"/>
+              <a:t>They did not give a comparison btw S-SGD and corrupting neurons and weights while training</a:t>
+            </a:r>
+          </a:p>
+          <a:p>
+            <a:pPr marL="228600" lvl="0" indent="-228600">
+              <a:spcBef>
+                <a:spcPts val="0"/>
+              </a:spcBef>
+              <a:buAutoNum type="arabicPeriod"/>
+            </a:pPr>
+            <a:r>
+              <a:rPr lang="en-US" baseline="0" dirty="0" smtClean="0"/>
+              <a:t>How will this technique work for unsupervised learning is not discussed </a:t>
+            </a:r>
+          </a:p>
+          <a:p>
+            <a:pPr marL="0" lvl="0" indent="0">
+              <a:spcBef>
+                <a:spcPts val="0"/>
+              </a:spcBef>
+              <a:buNone/>
+            </a:pPr>
+            <a:endParaRPr dirty="0"/>
           </a:p>
         </p:txBody>
       </p:sp>
@@ -2496,15 +2552,15 @@
             </a:pPr>
             <a:r>
               <a:rPr lang="en-US" dirty="0" smtClean="0"/>
-              <a:t>In fact, there are many real-life scenarios where perpetrators abuse location-</a:t>
+              <a:t>In fact, there are many real-life scenarios where perpetrators </a:t>
             </a:r>
             <a:r>
-              <a:rPr lang="en-US" dirty="0" err="1" smtClean="0"/>
-              <a:t>detectiontechnologies</a:t>
+              <a:rPr lang="en-US" smtClean="0"/>
+              <a:t>abuse location-detection technologies </a:t>
             </a:r>
             <a:r>
               <a:rPr lang="en-US" dirty="0" smtClean="0"/>
-              <a:t> to gain access to private location information about victims</a:t>
+              <a:t>to gain access to private location information about victims</a:t>
             </a:r>
             <a:endParaRPr dirty="0"/>
           </a:p>
@@ -2612,7 +2668,7 @@
               </a:spcBef>
               <a:buNone/>
             </a:pPr>
-            <a:endParaRPr/>
+            <a:endParaRPr dirty="0"/>
           </a:p>
         </p:txBody>
       </p:sp>
@@ -6292,7 +6348,7 @@
     <p:sldLayoutId id="2147483656" r:id="rId7"/>
     <p:sldLayoutId id="2147483657" r:id="rId8"/>
   </p:sldLayoutIdLst>
-  <p:hf sldNum="0" hdr="0" ftr="0" dt="0"/>
+  <p:hf hdr="0" dt="0"/>
   <p:txStyles>
     <p:titleStyle>
       <a:defPPr marR="0" lvl="0" algn="l" rtl="0">
@@ -6765,8 +6821,8 @@
         </p:nvSpPr>
         <p:spPr>
           <a:xfrm>
-            <a:off x="1117157" y="718015"/>
-            <a:ext cx="6680399" cy="2599342"/>
+            <a:off x="1117157" y="834978"/>
+            <a:ext cx="6680399" cy="1950757"/>
           </a:xfrm>
           <a:prstGeom prst="rect">
             <a:avLst/>
@@ -6795,13 +6851,13 @@
               <a:rPr lang="en-US" sz="4400" dirty="0" smtClean="0"/>
               <a:t>MOBILITY PREDICTION</a:t>
             </a:r>
+            <a:r>
+              <a:rPr lang="en-US" sz="4400" smtClean="0"/>
+              <a:t/>
+            </a:r>
             <a:br>
-              <a:rPr lang="en-US" sz="4400" dirty="0" smtClean="0"/>
+              <a:rPr lang="en-US" sz="4400" smtClean="0"/>
             </a:br>
-            <a:r>
-              <a:rPr lang="en-US" sz="4400" dirty="0" smtClean="0"/>
-              <a:t>PLATFORM</a:t>
-            </a:r>
             <a:endParaRPr lang="en" sz="4400" dirty="0"/>
           </a:p>
         </p:txBody>
@@ -9147,6 +9203,48 @@
           </a:fontRef>
         </p:style>
       </p:cxnSp>
+      <p:sp>
+        <p:nvSpPr>
+          <p:cNvPr id="51" name="TextBox 50"/>
+          <p:cNvSpPr txBox="1"/>
+          <p:nvPr/>
+        </p:nvSpPr>
+        <p:spPr>
+          <a:xfrm>
+            <a:off x="8770711" y="6508430"/>
+            <a:ext cx="253813" cy="307777"/>
+          </a:xfrm>
+          <a:prstGeom prst="rect">
+            <a:avLst/>
+          </a:prstGeom>
+          <a:noFill/>
+        </p:spPr>
+        <p:txBody>
+          <a:bodyPr wrap="square" rtlCol="0">
+            <a:spAutoFit/>
+          </a:bodyPr>
+          <a:lstStyle/>
+          <a:p>
+            <a:r>
+              <a:rPr lang="en-US" b="1" dirty="0">
+                <a:solidFill>
+                  <a:schemeClr val="bg1">
+                    <a:lumMod val="75000"/>
+                  </a:schemeClr>
+                </a:solidFill>
+              </a:rPr>
+              <a:t>8</a:t>
+            </a:r>
+            <a:endParaRPr lang="hy-AM" b="1" dirty="0">
+              <a:solidFill>
+                <a:schemeClr val="bg1">
+                  <a:lumMod val="75000"/>
+                </a:schemeClr>
+              </a:solidFill>
+            </a:endParaRPr>
+          </a:p>
+        </p:txBody>
+      </p:sp>
     </p:spTree>
     <p:extLst>
       <p:ext uri="{BB962C8B-B14F-4D97-AF65-F5344CB8AC3E}">
@@ -10928,7 +11026,7 @@
         </p:nvSpPr>
         <p:spPr>
           <a:xfrm>
-            <a:off x="985007" y="2181006"/>
+            <a:off x="1176401" y="1649357"/>
             <a:ext cx="1392865" cy="3530009"/>
           </a:xfrm>
           <a:prstGeom prst="rect">
@@ -10979,7 +11077,7 @@
         </p:nvSpPr>
         <p:spPr>
           <a:xfrm>
-            <a:off x="3620367" y="2181006"/>
+            <a:off x="3811761" y="1649357"/>
             <a:ext cx="1644502" cy="3530009"/>
           </a:xfrm>
           <a:prstGeom prst="rect">
@@ -11030,7 +11128,7 @@
         </p:nvSpPr>
         <p:spPr>
           <a:xfrm>
-            <a:off x="6596177" y="1663482"/>
+            <a:off x="6787571" y="1131833"/>
             <a:ext cx="1644502" cy="4146698"/>
           </a:xfrm>
           <a:prstGeom prst="rect">
@@ -11081,7 +11179,7 @@
         </p:nvSpPr>
         <p:spPr>
           <a:xfrm>
-            <a:off x="1536383" y="2328529"/>
+            <a:off x="1727777" y="1796880"/>
             <a:ext cx="567663" cy="567663"/>
           </a:xfrm>
           <a:prstGeom prst="ellipse">
@@ -11126,7 +11224,7 @@
         </p:nvSpPr>
         <p:spPr>
           <a:xfrm>
-            <a:off x="1536383" y="3076945"/>
+            <a:off x="1727777" y="2545296"/>
             <a:ext cx="567663" cy="567663"/>
           </a:xfrm>
           <a:prstGeom prst="ellipse">
@@ -11171,7 +11269,7 @@
         </p:nvSpPr>
         <p:spPr>
           <a:xfrm>
-            <a:off x="1536383" y="3892403"/>
+            <a:off x="1727777" y="3360754"/>
             <a:ext cx="567663" cy="567663"/>
           </a:xfrm>
           <a:prstGeom prst="ellipse">
@@ -11216,7 +11314,7 @@
         </p:nvSpPr>
         <p:spPr>
           <a:xfrm>
-            <a:off x="1536382" y="5045885"/>
+            <a:off x="1727776" y="4514236"/>
             <a:ext cx="567663" cy="567663"/>
           </a:xfrm>
           <a:prstGeom prst="ellipse">
@@ -11261,7 +11359,7 @@
         </p:nvSpPr>
         <p:spPr>
           <a:xfrm>
-            <a:off x="6854290" y="3431956"/>
+            <a:off x="7045684" y="2900307"/>
             <a:ext cx="1028110" cy="1028110"/>
           </a:xfrm>
           <a:prstGeom prst="ellipse">
@@ -11306,7 +11404,7 @@
         </p:nvSpPr>
         <p:spPr>
           <a:xfrm flipV="1">
-            <a:off x="1777683" y="4528433"/>
+            <a:off x="1969077" y="3996784"/>
             <a:ext cx="74278" cy="74278"/>
           </a:xfrm>
           <a:prstGeom prst="ellipse">
@@ -11358,7 +11456,7 @@
         </p:nvSpPr>
         <p:spPr>
           <a:xfrm flipV="1">
-            <a:off x="1777683" y="4699950"/>
+            <a:off x="1969077" y="4168301"/>
             <a:ext cx="74278" cy="74278"/>
           </a:xfrm>
           <a:prstGeom prst="ellipse">
@@ -11410,7 +11508,7 @@
         </p:nvSpPr>
         <p:spPr>
           <a:xfrm flipV="1">
-            <a:off x="1770592" y="4873616"/>
+            <a:off x="1961986" y="4341967"/>
             <a:ext cx="74278" cy="74278"/>
           </a:xfrm>
           <a:prstGeom prst="ellipse">
@@ -11454,146 +11552,6 @@
           </a:p>
         </p:txBody>
       </p:sp>
-      <p:cxnSp>
-        <p:nvCxnSpPr>
-          <p:cNvPr id="16" name="Straight Arrow Connector 15"/>
-          <p:cNvCxnSpPr>
-            <a:stCxn id="7" idx="6"/>
-          </p:cNvCxnSpPr>
-          <p:nvPr/>
-        </p:nvCxnSpPr>
-        <p:spPr>
-          <a:xfrm>
-            <a:off x="2104046" y="2612361"/>
-            <a:ext cx="4828363" cy="928281"/>
-          </a:xfrm>
-          <a:prstGeom prst="straightConnector1">
-            <a:avLst/>
-          </a:prstGeom>
-          <a:ln w="38100">
-            <a:tailEnd type="triangle"/>
-          </a:ln>
-        </p:spPr>
-        <p:style>
-          <a:lnRef idx="1">
-            <a:schemeClr val="accent1"/>
-          </a:lnRef>
-          <a:fillRef idx="0">
-            <a:schemeClr val="accent1"/>
-          </a:fillRef>
-          <a:effectRef idx="0">
-            <a:schemeClr val="accent1"/>
-          </a:effectRef>
-          <a:fontRef idx="minor">
-            <a:schemeClr val="tx1"/>
-          </a:fontRef>
-        </p:style>
-      </p:cxnSp>
-      <p:cxnSp>
-        <p:nvCxnSpPr>
-          <p:cNvPr id="18" name="Straight Arrow Connector 17"/>
-          <p:cNvCxnSpPr>
-            <a:stCxn id="8" idx="6"/>
-          </p:cNvCxnSpPr>
-          <p:nvPr/>
-        </p:nvCxnSpPr>
-        <p:spPr>
-          <a:xfrm>
-            <a:off x="2104046" y="3360777"/>
-            <a:ext cx="4750244" cy="447781"/>
-          </a:xfrm>
-          <a:prstGeom prst="straightConnector1">
-            <a:avLst/>
-          </a:prstGeom>
-          <a:ln w="38100">
-            <a:tailEnd type="triangle"/>
-          </a:ln>
-        </p:spPr>
-        <p:style>
-          <a:lnRef idx="1">
-            <a:schemeClr val="accent1"/>
-          </a:lnRef>
-          <a:fillRef idx="0">
-            <a:schemeClr val="accent1"/>
-          </a:fillRef>
-          <a:effectRef idx="0">
-            <a:schemeClr val="accent1"/>
-          </a:effectRef>
-          <a:fontRef idx="minor">
-            <a:schemeClr val="tx1"/>
-          </a:fontRef>
-        </p:style>
-      </p:cxnSp>
-      <p:cxnSp>
-        <p:nvCxnSpPr>
-          <p:cNvPr id="20" name="Straight Arrow Connector 19"/>
-          <p:cNvCxnSpPr>
-            <a:stCxn id="9" idx="6"/>
-          </p:cNvCxnSpPr>
-          <p:nvPr/>
-        </p:nvCxnSpPr>
-        <p:spPr>
-          <a:xfrm flipV="1">
-            <a:off x="2104046" y="4176234"/>
-            <a:ext cx="4750244" cy="1"/>
-          </a:xfrm>
-          <a:prstGeom prst="straightConnector1">
-            <a:avLst/>
-          </a:prstGeom>
-          <a:ln w="38100">
-            <a:tailEnd type="triangle"/>
-          </a:ln>
-        </p:spPr>
-        <p:style>
-          <a:lnRef idx="1">
-            <a:schemeClr val="accent1"/>
-          </a:lnRef>
-          <a:fillRef idx="0">
-            <a:schemeClr val="accent1"/>
-          </a:fillRef>
-          <a:effectRef idx="0">
-            <a:schemeClr val="accent1"/>
-          </a:effectRef>
-          <a:fontRef idx="minor">
-            <a:schemeClr val="tx1"/>
-          </a:fontRef>
-        </p:style>
-      </p:cxnSp>
-      <p:cxnSp>
-        <p:nvCxnSpPr>
-          <p:cNvPr id="22" name="Straight Arrow Connector 21"/>
-          <p:cNvCxnSpPr>
-            <a:stCxn id="10" idx="6"/>
-          </p:cNvCxnSpPr>
-          <p:nvPr/>
-        </p:nvCxnSpPr>
-        <p:spPr>
-          <a:xfrm flipV="1">
-            <a:off x="2104045" y="4433332"/>
-            <a:ext cx="4828364" cy="896385"/>
-          </a:xfrm>
-          <a:prstGeom prst="straightConnector1">
-            <a:avLst/>
-          </a:prstGeom>
-          <a:ln w="38100">
-            <a:tailEnd type="triangle"/>
-          </a:ln>
-        </p:spPr>
-        <p:style>
-          <a:lnRef idx="1">
-            <a:schemeClr val="accent1"/>
-          </a:lnRef>
-          <a:fillRef idx="0">
-            <a:schemeClr val="accent1"/>
-          </a:fillRef>
-          <a:effectRef idx="0">
-            <a:schemeClr val="accent1"/>
-          </a:effectRef>
-          <a:fontRef idx="minor">
-            <a:schemeClr val="tx1"/>
-          </a:fontRef>
-        </p:style>
-      </p:cxnSp>
       <p:sp>
         <p:nvSpPr>
           <p:cNvPr id="25" name="TextBox 24"/>
@@ -11602,8 +11560,8 @@
         </p:nvSpPr>
         <p:spPr>
           <a:xfrm>
-            <a:off x="758110" y="2147776"/>
-            <a:ext cx="923330" cy="3530009"/>
+            <a:off x="912516" y="2083319"/>
+            <a:ext cx="923330" cy="2719411"/>
           </a:xfrm>
           <a:prstGeom prst="rect">
             <a:avLst/>
@@ -11667,7 +11625,7 @@
             </p:nvSpPr>
             <p:spPr>
               <a:xfrm>
-                <a:off x="6964693" y="3712943"/>
+                <a:off x="7156087" y="3181294"/>
                 <a:ext cx="775920" cy="430887"/>
               </a:xfrm>
               <a:prstGeom prst="rect">
@@ -11762,7 +11720,7 @@
             </p:nvSpPr>
             <p:spPr>
               <a:xfrm>
-                <a:off x="6964693" y="3712943"/>
+                <a:off x="7156087" y="3181294"/>
                 <a:ext cx="775920" cy="430887"/>
               </a:xfrm>
               <a:prstGeom prst="rect">
@@ -11771,7 +11729,7 @@
               <a:blipFill rotWithShape="0">
                 <a:blip r:embed="rId3"/>
                 <a:stretch>
-                  <a:fillRect l="-5512" r="-7874" b="-21127"/>
+                  <a:fillRect l="-5512" r="-7874" b="-19718"/>
                 </a:stretch>
               </a:blipFill>
             </p:spPr>
@@ -11798,7 +11756,7 @@
         </p:nvSpPr>
         <p:spPr>
           <a:xfrm>
-            <a:off x="3636754" y="5336904"/>
+            <a:off x="3828148" y="4805255"/>
             <a:ext cx="1644502" cy="369332"/>
           </a:xfrm>
           <a:prstGeom prst="rect">
@@ -11841,7 +11799,7 @@
         </p:nvSpPr>
         <p:spPr>
           <a:xfrm>
-            <a:off x="6546094" y="5080463"/>
+            <a:off x="6737488" y="4548814"/>
             <a:ext cx="1644502" cy="646331"/>
           </a:xfrm>
           <a:prstGeom prst="rect">
@@ -11899,7 +11857,7 @@
         </p:nvCxnSpPr>
         <p:spPr>
           <a:xfrm flipV="1">
-            <a:off x="7882400" y="3946010"/>
+            <a:off x="8073794" y="3414361"/>
             <a:ext cx="527953" cy="1"/>
           </a:xfrm>
           <a:prstGeom prst="straightConnector1">
@@ -11932,7 +11890,7 @@
         </p:nvSpPr>
         <p:spPr>
           <a:xfrm>
-            <a:off x="8096876" y="2245794"/>
+            <a:off x="8288270" y="1714145"/>
             <a:ext cx="738664" cy="3530009"/>
           </a:xfrm>
           <a:prstGeom prst="rect">
@@ -11983,7 +11941,7 @@
         </p:nvCxnSpPr>
         <p:spPr>
           <a:xfrm>
-            <a:off x="7150506" y="1786274"/>
+            <a:off x="7341900" y="1254625"/>
             <a:ext cx="0" cy="1435218"/>
           </a:xfrm>
           <a:prstGeom prst="line">
@@ -12020,7 +11978,7 @@
         </p:nvCxnSpPr>
         <p:spPr>
           <a:xfrm>
-            <a:off x="6687879" y="2758919"/>
+            <a:off x="6879273" y="2227270"/>
             <a:ext cx="1408997" cy="0"/>
           </a:xfrm>
           <a:prstGeom prst="line">
@@ -12070,7 +12028,7 @@
         </p:blipFill>
         <p:spPr>
           <a:xfrm>
-            <a:off x="6776591" y="1858047"/>
+            <a:off x="6967985" y="1326398"/>
             <a:ext cx="1327686" cy="995769"/>
           </a:xfrm>
           <a:prstGeom prst="rect">
@@ -12088,7 +12046,7 @@
             </p:nvSpPr>
             <p:spPr>
               <a:xfrm>
-                <a:off x="1677513" y="2473975"/>
+                <a:off x="1868907" y="1942326"/>
                 <a:ext cx="281680" cy="246221"/>
               </a:xfrm>
               <a:prstGeom prst="rect">
@@ -12166,7 +12124,7 @@
             </p:nvSpPr>
             <p:spPr>
               <a:xfrm>
-                <a:off x="1677513" y="2473975"/>
+                <a:off x="1868907" y="1942326"/>
                 <a:ext cx="281680" cy="246221"/>
               </a:xfrm>
               <a:prstGeom prst="rect">
@@ -12175,7 +12133,7 @@
               <a:blipFill rotWithShape="0">
                 <a:blip r:embed="rId5"/>
                 <a:stretch>
-                  <a:fillRect l="-13043" r="-2174" b="-17500"/>
+                  <a:fillRect l="-15217" r="-2174" b="-17500"/>
                 </a:stretch>
               </a:blipFill>
             </p:spPr>
@@ -12204,7 +12162,7 @@
             </p:nvSpPr>
             <p:spPr>
               <a:xfrm>
-                <a:off x="1677513" y="3216255"/>
+                <a:off x="1868907" y="2684606"/>
                 <a:ext cx="286425" cy="246221"/>
               </a:xfrm>
               <a:prstGeom prst="rect">
@@ -12282,7 +12240,7 @@
             </p:nvSpPr>
             <p:spPr>
               <a:xfrm>
-                <a:off x="1677513" y="3216255"/>
+                <a:off x="1868907" y="2684606"/>
                 <a:ext cx="286425" cy="246221"/>
               </a:xfrm>
               <a:prstGeom prst="rect">
@@ -12291,7 +12249,7 @@
               <a:blipFill rotWithShape="0">
                 <a:blip r:embed="rId6"/>
                 <a:stretch>
-                  <a:fillRect l="-12766" r="-2128" b="-17500"/>
+                  <a:fillRect l="-14894" r="-2128" b="-14634"/>
                 </a:stretch>
               </a:blipFill>
             </p:spPr>
@@ -12320,7 +12278,7 @@
             </p:nvSpPr>
             <p:spPr>
               <a:xfrm>
-                <a:off x="1682929" y="4037709"/>
+                <a:off x="1874323" y="3506060"/>
                 <a:ext cx="286425" cy="246221"/>
               </a:xfrm>
               <a:prstGeom prst="rect">
@@ -12398,7 +12356,7 @@
             </p:nvSpPr>
             <p:spPr>
               <a:xfrm>
-                <a:off x="1682929" y="4037709"/>
+                <a:off x="1874323" y="3506060"/>
                 <a:ext cx="286425" cy="246221"/>
               </a:xfrm>
               <a:prstGeom prst="rect">
@@ -12436,7 +12394,7 @@
             </p:nvSpPr>
             <p:spPr>
               <a:xfrm>
-                <a:off x="1677513" y="5173881"/>
+                <a:off x="1868907" y="4642232"/>
                 <a:ext cx="295594" cy="246221"/>
               </a:xfrm>
               <a:prstGeom prst="rect">
@@ -12514,7 +12472,7 @@
             </p:nvSpPr>
             <p:spPr>
               <a:xfrm>
-                <a:off x="1677513" y="5173881"/>
+                <a:off x="1868907" y="4642232"/>
                 <a:ext cx="295594" cy="246221"/>
               </a:xfrm>
               <a:prstGeom prst="rect">
@@ -12523,7 +12481,7 @@
               <a:blipFill rotWithShape="0">
                 <a:blip r:embed="rId8"/>
                 <a:stretch>
-                  <a:fillRect l="-12245" r="-2041" b="-17500"/>
+                  <a:fillRect l="-14583" r="-2083" b="-17500"/>
                 </a:stretch>
               </a:blipFill>
             </p:spPr>
@@ -12542,8 +12500,8 @@
           </p:sp>
         </mc:Fallback>
       </mc:AlternateContent>
-      <mc:AlternateContent xmlns:mc="http://schemas.openxmlformats.org/markup-compatibility/2006">
-        <mc:Choice xmlns:a14="http://schemas.microsoft.com/office/drawing/2010/main" Requires="a14">
+      <mc:AlternateContent xmlns:mc="http://schemas.openxmlformats.org/markup-compatibility/2006" xmlns:a14="http://schemas.microsoft.com/office/drawing/2010/main">
+        <mc:Choice Requires="a14">
           <p:sp>
             <p:nvSpPr>
               <p:cNvPr id="43" name="TextBox 42"/>
@@ -12552,7 +12510,7 @@
             </p:nvSpPr>
             <p:spPr>
               <a:xfrm>
-                <a:off x="2085509" y="2497959"/>
+                <a:off x="2276903" y="1923778"/>
                 <a:ext cx="2076302" cy="276999"/>
               </a:xfrm>
               <a:prstGeom prst="rect">
@@ -12619,7 +12577,7 @@
             </p:txBody>
           </p:sp>
         </mc:Choice>
-        <mc:Fallback>
+        <mc:Fallback xmlns="">
           <p:sp>
             <p:nvSpPr>
               <p:cNvPr id="43" name="TextBox 42"/>
@@ -12630,7 +12588,7 @@
             </p:nvSpPr>
             <p:spPr>
               <a:xfrm>
-                <a:off x="2085509" y="2497959"/>
+                <a:off x="2276903" y="1923778"/>
                 <a:ext cx="2076302" cy="276999"/>
               </a:xfrm>
               <a:prstGeom prst="rect">
@@ -12658,8 +12616,8 @@
           </p:sp>
         </mc:Fallback>
       </mc:AlternateContent>
-      <mc:AlternateContent xmlns:mc="http://schemas.openxmlformats.org/markup-compatibility/2006">
-        <mc:Choice xmlns:a14="http://schemas.microsoft.com/office/drawing/2010/main" Requires="a14">
+      <mc:AlternateContent xmlns:mc="http://schemas.openxmlformats.org/markup-compatibility/2006" xmlns:a14="http://schemas.microsoft.com/office/drawing/2010/main">
+        <mc:Choice Requires="a14">
           <p:sp>
             <p:nvSpPr>
               <p:cNvPr id="45" name="TextBox 44"/>
@@ -12668,7 +12626,7 @@
             </p:nvSpPr>
             <p:spPr>
               <a:xfrm>
-                <a:off x="1831922" y="3126351"/>
+                <a:off x="2023316" y="2701032"/>
                 <a:ext cx="2583475" cy="276999"/>
               </a:xfrm>
               <a:prstGeom prst="rect">
@@ -12735,7 +12693,7 @@
             </p:txBody>
           </p:sp>
         </mc:Choice>
-        <mc:Fallback>
+        <mc:Fallback xmlns="">
           <p:sp>
             <p:nvSpPr>
               <p:cNvPr id="45" name="TextBox 44"/>
@@ -12746,7 +12704,7 @@
             </p:nvSpPr>
             <p:spPr>
               <a:xfrm>
-                <a:off x="1831922" y="3126351"/>
+                <a:off x="2023316" y="2701032"/>
                 <a:ext cx="2583475" cy="276999"/>
               </a:xfrm>
               <a:prstGeom prst="rect">
@@ -12755,7 +12713,7 @@
               <a:blipFill rotWithShape="0">
                 <a:blip r:embed="rId10"/>
                 <a:stretch>
-                  <a:fillRect b="-17778"/>
+                  <a:fillRect b="-17391"/>
                 </a:stretch>
               </a:blipFill>
             </p:spPr>
@@ -12774,8 +12732,8 @@
           </p:sp>
         </mc:Fallback>
       </mc:AlternateContent>
-      <mc:AlternateContent xmlns:mc="http://schemas.openxmlformats.org/markup-compatibility/2006">
-        <mc:Choice xmlns:a14="http://schemas.microsoft.com/office/drawing/2010/main" Requires="a14">
+      <mc:AlternateContent xmlns:mc="http://schemas.openxmlformats.org/markup-compatibility/2006" xmlns:a14="http://schemas.microsoft.com/office/drawing/2010/main">
+        <mc:Choice Requires="a14">
           <p:sp>
             <p:nvSpPr>
               <p:cNvPr id="46" name="TextBox 45"/>
@@ -12784,7 +12742,7 @@
             </p:nvSpPr>
             <p:spPr>
               <a:xfrm>
-                <a:off x="2333811" y="3815745"/>
+                <a:off x="2525205" y="3432957"/>
                 <a:ext cx="1579696" cy="276999"/>
               </a:xfrm>
               <a:prstGeom prst="rect">
@@ -12851,7 +12809,7 @@
             </p:txBody>
           </p:sp>
         </mc:Choice>
-        <mc:Fallback>
+        <mc:Fallback xmlns="">
           <p:sp>
             <p:nvSpPr>
               <p:cNvPr id="46" name="TextBox 45"/>
@@ -12862,7 +12820,7 @@
             </p:nvSpPr>
             <p:spPr>
               <a:xfrm>
-                <a:off x="2333811" y="3815745"/>
+                <a:off x="2525205" y="3432957"/>
                 <a:ext cx="1579696" cy="276999"/>
               </a:xfrm>
               <a:prstGeom prst="rect">
@@ -12871,7 +12829,7 @@
               <a:blipFill rotWithShape="0">
                 <a:blip r:embed="rId11"/>
                 <a:stretch>
-                  <a:fillRect b="-17778"/>
+                  <a:fillRect b="-17391"/>
                 </a:stretch>
               </a:blipFill>
             </p:spPr>
@@ -12890,8 +12848,8 @@
           </p:sp>
         </mc:Fallback>
       </mc:AlternateContent>
-      <mc:AlternateContent xmlns:mc="http://schemas.openxmlformats.org/markup-compatibility/2006">
-        <mc:Choice xmlns:a14="http://schemas.microsoft.com/office/drawing/2010/main" Requires="a14">
+      <mc:AlternateContent xmlns:mc="http://schemas.openxmlformats.org/markup-compatibility/2006" xmlns:a14="http://schemas.microsoft.com/office/drawing/2010/main">
+        <mc:Choice Requires="a14">
           <p:sp>
             <p:nvSpPr>
               <p:cNvPr id="47" name="TextBox 46"/>
@@ -12900,7 +12858,7 @@
             </p:nvSpPr>
             <p:spPr>
               <a:xfrm>
-                <a:off x="2356129" y="4786212"/>
+                <a:off x="2547523" y="4350260"/>
                 <a:ext cx="1646736" cy="276999"/>
               </a:xfrm>
               <a:prstGeom prst="rect">
@@ -12967,7 +12925,7 @@
             </p:txBody>
           </p:sp>
         </mc:Choice>
-        <mc:Fallback>
+        <mc:Fallback xmlns="">
           <p:sp>
             <p:nvSpPr>
               <p:cNvPr id="47" name="TextBox 46"/>
@@ -12978,7 +12936,7 @@
             </p:nvSpPr>
             <p:spPr>
               <a:xfrm>
-                <a:off x="2356129" y="4786212"/>
+                <a:off x="2547523" y="4350260"/>
                 <a:ext cx="1646736" cy="276999"/>
               </a:xfrm>
               <a:prstGeom prst="rect">
@@ -12987,7 +12945,7 @@
               <a:blipFill rotWithShape="0">
                 <a:blip r:embed="rId12"/>
                 <a:stretch>
-                  <a:fillRect b="-17391"/>
+                  <a:fillRect b="-20000"/>
                 </a:stretch>
               </a:blipFill>
             </p:spPr>
@@ -13014,7 +12972,7 @@
         </p:nvSpPr>
         <p:spPr>
           <a:xfrm>
-            <a:off x="4149777" y="2537067"/>
+            <a:off x="4341171" y="2005418"/>
             <a:ext cx="618930" cy="651018"/>
           </a:xfrm>
           <a:prstGeom prst="ellipse">
@@ -13060,7 +13018,7 @@
         </p:nvSpPr>
         <p:spPr>
           <a:xfrm>
-            <a:off x="4149777" y="3285799"/>
+            <a:off x="4341171" y="2754150"/>
             <a:ext cx="618930" cy="651018"/>
           </a:xfrm>
           <a:prstGeom prst="ellipse">
@@ -13106,7 +13064,7 @@
         </p:nvSpPr>
         <p:spPr>
           <a:xfrm>
-            <a:off x="4170642" y="3994748"/>
+            <a:off x="4362036" y="3463099"/>
             <a:ext cx="618930" cy="651018"/>
           </a:xfrm>
           <a:prstGeom prst="ellipse">
@@ -13152,7 +13110,7 @@
         </p:nvSpPr>
         <p:spPr>
           <a:xfrm>
-            <a:off x="4153028" y="4744931"/>
+            <a:off x="4344422" y="4213282"/>
             <a:ext cx="618930" cy="651018"/>
           </a:xfrm>
           <a:prstGeom prst="ellipse">
@@ -13198,7 +13156,7 @@
         </p:nvSpPr>
         <p:spPr>
           <a:xfrm>
-            <a:off x="3620367" y="5810180"/>
+            <a:off x="3811761" y="5278531"/>
             <a:ext cx="1644502" cy="369332"/>
           </a:xfrm>
           <a:prstGeom prst="rect">
@@ -13233,6 +13191,333 @@
           </a:p>
         </p:txBody>
       </p:sp>
+      <p:sp>
+        <p:nvSpPr>
+          <p:cNvPr id="53" name="TextBox 52"/>
+          <p:cNvSpPr txBox="1"/>
+          <p:nvPr/>
+        </p:nvSpPr>
+        <p:spPr>
+          <a:xfrm>
+            <a:off x="8770711" y="6508430"/>
+            <a:ext cx="253813" cy="307777"/>
+          </a:xfrm>
+          <a:prstGeom prst="rect">
+            <a:avLst/>
+          </a:prstGeom>
+          <a:noFill/>
+        </p:spPr>
+        <p:txBody>
+          <a:bodyPr wrap="square" rtlCol="0">
+            <a:spAutoFit/>
+          </a:bodyPr>
+          <a:lstStyle/>
+          <a:p>
+            <a:r>
+              <a:rPr lang="en-US" b="1" dirty="0">
+                <a:solidFill>
+                  <a:schemeClr val="bg1">
+                    <a:lumMod val="75000"/>
+                  </a:schemeClr>
+                </a:solidFill>
+              </a:rPr>
+              <a:t>9</a:t>
+            </a:r>
+            <a:endParaRPr lang="hy-AM" b="1" dirty="0">
+              <a:solidFill>
+                <a:schemeClr val="bg1">
+                  <a:lumMod val="75000"/>
+                </a:schemeClr>
+              </a:solidFill>
+            </a:endParaRPr>
+          </a:p>
+        </p:txBody>
+      </p:sp>
+      <p:cxnSp>
+        <p:nvCxnSpPr>
+          <p:cNvPr id="13" name="Straight Arrow Connector 12"/>
+          <p:cNvCxnSpPr>
+            <a:stCxn id="43" idx="1"/>
+            <a:endCxn id="35" idx="2"/>
+          </p:cNvCxnSpPr>
+          <p:nvPr/>
+        </p:nvCxnSpPr>
+        <p:spPr>
+          <a:xfrm>
+            <a:off x="2276903" y="2062278"/>
+            <a:ext cx="2064268" cy="268649"/>
+          </a:xfrm>
+          <a:prstGeom prst="straightConnector1">
+            <a:avLst/>
+          </a:prstGeom>
+          <a:ln>
+            <a:tailEnd type="triangle"/>
+          </a:ln>
+        </p:spPr>
+        <p:style>
+          <a:lnRef idx="1">
+            <a:schemeClr val="accent1"/>
+          </a:lnRef>
+          <a:fillRef idx="0">
+            <a:schemeClr val="accent1"/>
+          </a:fillRef>
+          <a:effectRef idx="0">
+            <a:schemeClr val="accent1"/>
+          </a:effectRef>
+          <a:fontRef idx="minor">
+            <a:schemeClr val="tx1"/>
+          </a:fontRef>
+        </p:style>
+      </p:cxnSp>
+      <p:cxnSp>
+        <p:nvCxnSpPr>
+          <p:cNvPr id="19" name="Straight Arrow Connector 18"/>
+          <p:cNvCxnSpPr>
+            <a:endCxn id="49" idx="2"/>
+          </p:cNvCxnSpPr>
+          <p:nvPr/>
+        </p:nvCxnSpPr>
+        <p:spPr>
+          <a:xfrm>
+            <a:off x="2295439" y="2871701"/>
+            <a:ext cx="2045732" cy="207958"/>
+          </a:xfrm>
+          <a:prstGeom prst="straightConnector1">
+            <a:avLst/>
+          </a:prstGeom>
+          <a:ln>
+            <a:tailEnd type="triangle"/>
+          </a:ln>
+        </p:spPr>
+        <p:style>
+          <a:lnRef idx="1">
+            <a:schemeClr val="accent1"/>
+          </a:lnRef>
+          <a:fillRef idx="0">
+            <a:schemeClr val="accent1"/>
+          </a:fillRef>
+          <a:effectRef idx="0">
+            <a:schemeClr val="accent1"/>
+          </a:effectRef>
+          <a:fontRef idx="minor">
+            <a:schemeClr val="tx1"/>
+          </a:fontRef>
+        </p:style>
+      </p:cxnSp>
+      <p:cxnSp>
+        <p:nvCxnSpPr>
+          <p:cNvPr id="23" name="Straight Arrow Connector 22"/>
+          <p:cNvCxnSpPr>
+            <a:endCxn id="50" idx="2"/>
+          </p:cNvCxnSpPr>
+          <p:nvPr/>
+        </p:nvCxnSpPr>
+        <p:spPr>
+          <a:xfrm>
+            <a:off x="2295439" y="3612181"/>
+            <a:ext cx="2066597" cy="176427"/>
+          </a:xfrm>
+          <a:prstGeom prst="straightConnector1">
+            <a:avLst/>
+          </a:prstGeom>
+          <a:ln>
+            <a:tailEnd type="triangle"/>
+          </a:ln>
+        </p:spPr>
+        <p:style>
+          <a:lnRef idx="1">
+            <a:schemeClr val="accent1"/>
+          </a:lnRef>
+          <a:fillRef idx="0">
+            <a:schemeClr val="accent1"/>
+          </a:fillRef>
+          <a:effectRef idx="0">
+            <a:schemeClr val="accent1"/>
+          </a:effectRef>
+          <a:fontRef idx="minor">
+            <a:schemeClr val="tx1"/>
+          </a:fontRef>
+        </p:style>
+      </p:cxnSp>
+      <p:cxnSp>
+        <p:nvCxnSpPr>
+          <p:cNvPr id="28" name="Straight Arrow Connector 27"/>
+          <p:cNvCxnSpPr>
+            <a:stCxn id="10" idx="6"/>
+            <a:endCxn id="51" idx="2"/>
+          </p:cNvCxnSpPr>
+          <p:nvPr/>
+        </p:nvCxnSpPr>
+        <p:spPr>
+          <a:xfrm flipV="1">
+            <a:off x="2295439" y="4538791"/>
+            <a:ext cx="2048983" cy="259277"/>
+          </a:xfrm>
+          <a:prstGeom prst="straightConnector1">
+            <a:avLst/>
+          </a:prstGeom>
+          <a:ln>
+            <a:tailEnd type="triangle"/>
+          </a:ln>
+        </p:spPr>
+        <p:style>
+          <a:lnRef idx="1">
+            <a:schemeClr val="accent1"/>
+          </a:lnRef>
+          <a:fillRef idx="0">
+            <a:schemeClr val="accent1"/>
+          </a:fillRef>
+          <a:effectRef idx="0">
+            <a:schemeClr val="accent1"/>
+          </a:effectRef>
+          <a:fontRef idx="minor">
+            <a:schemeClr val="tx1"/>
+          </a:fontRef>
+        </p:style>
+      </p:cxnSp>
+      <p:cxnSp>
+        <p:nvCxnSpPr>
+          <p:cNvPr id="103" name="Straight Arrow Connector 102"/>
+          <p:cNvCxnSpPr>
+            <a:stCxn id="35" idx="6"/>
+            <a:endCxn id="11" idx="2"/>
+          </p:cNvCxnSpPr>
+          <p:nvPr/>
+        </p:nvCxnSpPr>
+        <p:spPr>
+          <a:xfrm>
+            <a:off x="4960101" y="2330927"/>
+            <a:ext cx="2085583" cy="1083435"/>
+          </a:xfrm>
+          <a:prstGeom prst="straightConnector1">
+            <a:avLst/>
+          </a:prstGeom>
+          <a:ln>
+            <a:tailEnd type="triangle"/>
+          </a:ln>
+        </p:spPr>
+        <p:style>
+          <a:lnRef idx="1">
+            <a:schemeClr val="accent1"/>
+          </a:lnRef>
+          <a:fillRef idx="0">
+            <a:schemeClr val="accent1"/>
+          </a:fillRef>
+          <a:effectRef idx="0">
+            <a:schemeClr val="accent1"/>
+          </a:effectRef>
+          <a:fontRef idx="minor">
+            <a:schemeClr val="tx1"/>
+          </a:fontRef>
+        </p:style>
+      </p:cxnSp>
+      <p:cxnSp>
+        <p:nvCxnSpPr>
+          <p:cNvPr id="105" name="Straight Arrow Connector 104"/>
+          <p:cNvCxnSpPr>
+            <a:stCxn id="49" idx="6"/>
+            <a:endCxn id="11" idx="2"/>
+          </p:cNvCxnSpPr>
+          <p:nvPr/>
+        </p:nvCxnSpPr>
+        <p:spPr>
+          <a:xfrm>
+            <a:off x="4960101" y="3079659"/>
+            <a:ext cx="2085583" cy="334703"/>
+          </a:xfrm>
+          <a:prstGeom prst="straightConnector1">
+            <a:avLst/>
+          </a:prstGeom>
+          <a:ln>
+            <a:tailEnd type="triangle"/>
+          </a:ln>
+        </p:spPr>
+        <p:style>
+          <a:lnRef idx="1">
+            <a:schemeClr val="accent1"/>
+          </a:lnRef>
+          <a:fillRef idx="0">
+            <a:schemeClr val="accent1"/>
+          </a:fillRef>
+          <a:effectRef idx="0">
+            <a:schemeClr val="accent1"/>
+          </a:effectRef>
+          <a:fontRef idx="minor">
+            <a:schemeClr val="tx1"/>
+          </a:fontRef>
+        </p:style>
+      </p:cxnSp>
+      <p:cxnSp>
+        <p:nvCxnSpPr>
+          <p:cNvPr id="107" name="Straight Arrow Connector 106"/>
+          <p:cNvCxnSpPr>
+            <a:endCxn id="11" idx="2"/>
+          </p:cNvCxnSpPr>
+          <p:nvPr/>
+        </p:nvCxnSpPr>
+        <p:spPr>
+          <a:xfrm flipV="1">
+            <a:off x="4980966" y="3414362"/>
+            <a:ext cx="2064718" cy="374246"/>
+          </a:xfrm>
+          <a:prstGeom prst="straightConnector1">
+            <a:avLst/>
+          </a:prstGeom>
+          <a:ln>
+            <a:tailEnd type="triangle"/>
+          </a:ln>
+        </p:spPr>
+        <p:style>
+          <a:lnRef idx="1">
+            <a:schemeClr val="accent1"/>
+          </a:lnRef>
+          <a:fillRef idx="0">
+            <a:schemeClr val="accent1"/>
+          </a:fillRef>
+          <a:effectRef idx="0">
+            <a:schemeClr val="accent1"/>
+          </a:effectRef>
+          <a:fontRef idx="minor">
+            <a:schemeClr val="tx1"/>
+          </a:fontRef>
+        </p:style>
+      </p:cxnSp>
+      <p:cxnSp>
+        <p:nvCxnSpPr>
+          <p:cNvPr id="109" name="Straight Arrow Connector 108"/>
+          <p:cNvCxnSpPr>
+            <a:stCxn id="51" idx="6"/>
+            <a:endCxn id="11" idx="2"/>
+          </p:cNvCxnSpPr>
+          <p:nvPr/>
+        </p:nvCxnSpPr>
+        <p:spPr>
+          <a:xfrm flipV="1">
+            <a:off x="4963352" y="3414362"/>
+            <a:ext cx="2082332" cy="1124429"/>
+          </a:xfrm>
+          <a:prstGeom prst="straightConnector1">
+            <a:avLst/>
+          </a:prstGeom>
+          <a:ln>
+            <a:tailEnd type="triangle"/>
+          </a:ln>
+        </p:spPr>
+        <p:style>
+          <a:lnRef idx="1">
+            <a:schemeClr val="accent1"/>
+          </a:lnRef>
+          <a:fillRef idx="0">
+            <a:schemeClr val="accent1"/>
+          </a:fillRef>
+          <a:effectRef idx="0">
+            <a:schemeClr val="accent1"/>
+          </a:effectRef>
+          <a:fontRef idx="minor">
+            <a:schemeClr val="tx1"/>
+          </a:fontRef>
+        </p:style>
+      </p:cxnSp>
     </p:spTree>
     <p:extLst>
       <p:ext uri="{BB962C8B-B14F-4D97-AF65-F5344CB8AC3E}">
@@ -17050,8 +17335,8 @@
           </a:p>
         </p:txBody>
       </p:sp>
-      <mc:AlternateContent xmlns:mc="http://schemas.openxmlformats.org/markup-compatibility/2006">
-        <mc:Choice xmlns:a14="http://schemas.microsoft.com/office/drawing/2010/main" Requires="a14">
+      <mc:AlternateContent xmlns:mc="http://schemas.openxmlformats.org/markup-compatibility/2006" xmlns:a14="http://schemas.microsoft.com/office/drawing/2010/main">
+        <mc:Choice Requires="a14">
           <p:sp>
             <p:nvSpPr>
               <p:cNvPr id="173" name="TextBox 172"/>
@@ -17180,7 +17465,7 @@
             </p:txBody>
           </p:sp>
         </mc:Choice>
-        <mc:Fallback>
+        <mc:Fallback xmlns="">
           <p:sp>
             <p:nvSpPr>
               <p:cNvPr id="173" name="TextBox 172"/>
@@ -17271,8 +17556,8 @@
           </a:p>
         </p:txBody>
       </p:sp>
-      <mc:AlternateContent xmlns:mc="http://schemas.openxmlformats.org/markup-compatibility/2006">
-        <mc:Choice xmlns:a14="http://schemas.microsoft.com/office/drawing/2010/main" Requires="a14">
+      <mc:AlternateContent xmlns:mc="http://schemas.openxmlformats.org/markup-compatibility/2006" xmlns:a14="http://schemas.microsoft.com/office/drawing/2010/main">
+        <mc:Choice Requires="a14">
           <p:sp>
             <p:nvSpPr>
               <p:cNvPr id="175" name="TextBox 174"/>
@@ -17536,7 +17821,7 @@
             </p:txBody>
           </p:sp>
         </mc:Choice>
-        <mc:Fallback>
+        <mc:Fallback xmlns="">
           <p:sp>
             <p:nvSpPr>
               <p:cNvPr id="175" name="TextBox 174"/>
@@ -17825,6 +18110,48 @@
               <a:solidFill>
                 <a:schemeClr val="bg1">
                   <a:lumMod val="95000"/>
+                </a:schemeClr>
+              </a:solidFill>
+            </a:endParaRPr>
+          </a:p>
+        </p:txBody>
+      </p:sp>
+      <p:sp>
+        <p:nvSpPr>
+          <p:cNvPr id="91" name="TextBox 90"/>
+          <p:cNvSpPr txBox="1"/>
+          <p:nvPr/>
+        </p:nvSpPr>
+        <p:spPr>
+          <a:xfrm>
+            <a:off x="8644271" y="6508430"/>
+            <a:ext cx="380254" cy="307777"/>
+          </a:xfrm>
+          <a:prstGeom prst="rect">
+            <a:avLst/>
+          </a:prstGeom>
+          <a:noFill/>
+        </p:spPr>
+        <p:txBody>
+          <a:bodyPr wrap="square" rtlCol="0">
+            <a:spAutoFit/>
+          </a:bodyPr>
+          <a:lstStyle/>
+          <a:p>
+            <a:r>
+              <a:rPr lang="en-US" b="1" dirty="0" smtClean="0">
+                <a:solidFill>
+                  <a:schemeClr val="bg1">
+                    <a:lumMod val="75000"/>
+                  </a:schemeClr>
+                </a:solidFill>
+              </a:rPr>
+              <a:t>10</a:t>
+            </a:r>
+            <a:endParaRPr lang="hy-AM" b="1" dirty="0">
+              <a:solidFill>
+                <a:schemeClr val="bg1">
+                  <a:lumMod val="75000"/>
                 </a:schemeClr>
               </a:solidFill>
             </a:endParaRPr>
@@ -18372,8 +18699,8 @@
         </p:nvSpPr>
         <p:spPr>
           <a:xfrm>
-            <a:off x="1056907" y="556970"/>
-            <a:ext cx="6858000" cy="791706"/>
+            <a:off x="1056907" y="322579"/>
+            <a:ext cx="6858000" cy="1256631"/>
           </a:xfrm>
           <a:prstGeom prst="rect">
             <a:avLst/>
@@ -18388,23 +18715,26 @@
             <a:pPr lvl="0"/>
             <a:r>
               <a:rPr lang="en-US" sz="2400" dirty="0"/>
-              <a:t>Distributed </a:t>
+              <a:t>Distributed Selective </a:t>
             </a:r>
             <a:r>
-              <a:rPr lang="en-US" sz="2400"/>
-              <a:t>Selective </a:t>
-            </a:r>
-            <a:r>
-              <a:rPr lang="en-US" sz="2400" smtClean="0"/>
+              <a:rPr lang="en-US" sz="2400" dirty="0" smtClean="0"/>
               <a:t/>
             </a:r>
             <a:br>
-              <a:rPr lang="en-US" sz="2400" smtClean="0"/>
+              <a:rPr lang="en-US" sz="2400" dirty="0" smtClean="0"/>
             </a:br>
             <a:r>
-              <a:rPr lang="en-US" sz="2400" smtClean="0"/>
-              <a:t>SGD </a:t>
+              <a:rPr lang="en-US" sz="2400" dirty="0" smtClean="0"/>
+              <a:t>Stochastic </a:t>
             </a:r>
+            <a:r>
+              <a:rPr lang="en-US" sz="2400" dirty="0" smtClean="0"/>
+              <a:t>Gradient Decent</a:t>
+            </a:r>
+            <a:br>
+              <a:rPr lang="en-US" sz="2400" dirty="0" smtClean="0"/>
+            </a:br>
             <a:r>
               <a:rPr lang="en-US" sz="2400" dirty="0" smtClean="0">
                 <a:solidFill>
@@ -22515,6 +22845,48 @@
           </a:fontRef>
         </p:style>
       </p:cxnSp>
+      <p:sp>
+        <p:nvSpPr>
+          <p:cNvPr id="66" name="TextBox 65"/>
+          <p:cNvSpPr txBox="1"/>
+          <p:nvPr/>
+        </p:nvSpPr>
+        <p:spPr>
+          <a:xfrm>
+            <a:off x="8644271" y="6508430"/>
+            <a:ext cx="380254" cy="307777"/>
+          </a:xfrm>
+          <a:prstGeom prst="rect">
+            <a:avLst/>
+          </a:prstGeom>
+          <a:noFill/>
+        </p:spPr>
+        <p:txBody>
+          <a:bodyPr wrap="square" rtlCol="0">
+            <a:spAutoFit/>
+          </a:bodyPr>
+          <a:lstStyle/>
+          <a:p>
+            <a:r>
+              <a:rPr lang="en-US" b="1" dirty="0" smtClean="0">
+                <a:solidFill>
+                  <a:schemeClr val="bg1">
+                    <a:lumMod val="75000"/>
+                  </a:schemeClr>
+                </a:solidFill>
+              </a:rPr>
+              <a:t>11</a:t>
+            </a:r>
+            <a:endParaRPr lang="hy-AM" b="1" dirty="0">
+              <a:solidFill>
+                <a:schemeClr val="bg1">
+                  <a:lumMod val="75000"/>
+                </a:schemeClr>
+              </a:solidFill>
+            </a:endParaRPr>
+          </a:p>
+        </p:txBody>
+      </p:sp>
     </p:spTree>
     <p:extLst>
       <p:ext uri="{BB962C8B-B14F-4D97-AF65-F5344CB8AC3E}">
@@ -25314,15 +25686,7 @@
                   <a:srgbClr val="FFC000"/>
                 </a:solidFill>
               </a:rPr>
-              <a:t>Parameter selection rate for </a:t>
-            </a:r>
-            <a:r>
-              <a:rPr lang="en-US" dirty="0" smtClean="0">
-                <a:solidFill>
-                  <a:srgbClr val="FFC000"/>
-                </a:solidFill>
-              </a:rPr>
-              <a:t>upload </a:t>
+              <a:t>Parameter selection rate for upload </a:t>
             </a:r>
             <a:r>
               <a:rPr lang="en-US" dirty="0" smtClean="0">
@@ -25965,8 +26329,8 @@
         </p:nvSpPr>
         <p:spPr>
           <a:xfrm>
-            <a:off x="2339151" y="1339702"/>
-            <a:ext cx="1019516" cy="1629587"/>
+            <a:off x="2435285" y="1526338"/>
+            <a:ext cx="879068" cy="1408243"/>
           </a:xfrm>
           <a:prstGeom prst="ellipse">
             <a:avLst/>
@@ -26198,10 +26562,11 @@
           <a:prstGeom prst="line">
             <a:avLst/>
           </a:prstGeom>
-          <a:ln w="19050">
+          <a:ln w="19050" cap="sq">
             <a:solidFill>
               <a:srgbClr val="00B050"/>
             </a:solidFill>
+            <a:prstDash val="lgDashDotDot"/>
           </a:ln>
         </p:spPr>
         <p:style>
@@ -26227,7 +26592,7 @@
         </p:nvSpPr>
         <p:spPr>
           <a:xfrm>
-            <a:off x="8289857" y="1277816"/>
+            <a:off x="8256778" y="1285874"/>
             <a:ext cx="530465" cy="530465"/>
           </a:xfrm>
           <a:prstGeom prst="ellipse">
@@ -26387,6 +26752,48 @@
               <a:solidFill>
                 <a:schemeClr val="bg1">
                   <a:lumMod val="85000"/>
+                </a:schemeClr>
+              </a:solidFill>
+            </a:endParaRPr>
+          </a:p>
+        </p:txBody>
+      </p:sp>
+      <p:sp>
+        <p:nvSpPr>
+          <p:cNvPr id="34" name="TextBox 33"/>
+          <p:cNvSpPr txBox="1"/>
+          <p:nvPr/>
+        </p:nvSpPr>
+        <p:spPr>
+          <a:xfrm>
+            <a:off x="8644271" y="6508430"/>
+            <a:ext cx="380254" cy="307777"/>
+          </a:xfrm>
+          <a:prstGeom prst="rect">
+            <a:avLst/>
+          </a:prstGeom>
+          <a:noFill/>
+        </p:spPr>
+        <p:txBody>
+          <a:bodyPr wrap="square" rtlCol="0">
+            <a:spAutoFit/>
+          </a:bodyPr>
+          <a:lstStyle/>
+          <a:p>
+            <a:r>
+              <a:rPr lang="en-US" b="1" dirty="0" smtClean="0">
+                <a:solidFill>
+                  <a:schemeClr val="bg1">
+                    <a:lumMod val="75000"/>
+                  </a:schemeClr>
+                </a:solidFill>
+              </a:rPr>
+              <a:t>12</a:t>
+            </a:r>
+            <a:endParaRPr lang="hy-AM" b="1" dirty="0">
+              <a:solidFill>
+                <a:schemeClr val="bg1">
+                  <a:lumMod val="75000"/>
                 </a:schemeClr>
               </a:solidFill>
             </a:endParaRPr>
@@ -30417,7 +30824,18 @@
           <a:lstStyle/>
           <a:p>
             <a:pPr algn="ctr"/>
-            <a:endParaRPr lang="hy-AM"/>
+            <a:r>
+              <a:rPr lang="en-US" dirty="0" smtClean="0"/>
+              <a:t>Bob </a:t>
+            </a:r>
+          </a:p>
+          <a:p>
+            <a:pPr algn="ctr"/>
+            <a:r>
+              <a:rPr lang="en-US" sz="1000" dirty="0" smtClean="0"/>
+              <a:t>Compliment</a:t>
+            </a:r>
+            <a:endParaRPr lang="hy-AM" sz="1000" dirty="0"/>
           </a:p>
         </p:txBody>
       </p:sp>
@@ -30430,7 +30848,7 @@
         <p:spPr>
           <a:xfrm>
             <a:off x="3343146" y="5592020"/>
-            <a:ext cx="1025574" cy="954107"/>
+            <a:ext cx="1025574" cy="738664"/>
           </a:xfrm>
           <a:prstGeom prst="rect">
             <a:avLst/>
@@ -30464,19 +30882,6 @@
                 </a:schemeClr>
               </a:solidFill>
             </a:endParaRPr>
-          </a:p>
-          <a:p>
-            <a:pPr algn="ctr"/>
-            <a:r>
-              <a:rPr lang="en-US" dirty="0" smtClean="0">
-                <a:solidFill>
-                  <a:schemeClr val="bg1">
-                    <a:lumMod val="85000"/>
-                  </a:schemeClr>
-                </a:solidFill>
-              </a:rPr>
-              <a:t>Including</a:t>
-            </a:r>
           </a:p>
           <a:p>
             <a:pPr algn="ctr"/>
@@ -30509,7 +30914,7 @@
         <p:spPr>
           <a:xfrm>
             <a:off x="4905299" y="5594039"/>
-            <a:ext cx="1025574" cy="954107"/>
+            <a:ext cx="1025574" cy="523220"/>
           </a:xfrm>
           <a:prstGeom prst="rect">
             <a:avLst/>
@@ -30544,35 +30949,44 @@
               </a:solidFill>
             </a:endParaRPr>
           </a:p>
-          <a:p>
-            <a:pPr algn="ctr"/>
+        </p:txBody>
+      </p:sp>
+      <p:sp>
+        <p:nvSpPr>
+          <p:cNvPr id="82" name="TextBox 81"/>
+          <p:cNvSpPr txBox="1"/>
+          <p:nvPr/>
+        </p:nvSpPr>
+        <p:spPr>
+          <a:xfrm>
+            <a:off x="8644271" y="6508430"/>
+            <a:ext cx="380254" cy="307777"/>
+          </a:xfrm>
+          <a:prstGeom prst="rect">
+            <a:avLst/>
+          </a:prstGeom>
+          <a:noFill/>
+        </p:spPr>
+        <p:txBody>
+          <a:bodyPr wrap="square" rtlCol="0">
+            <a:spAutoFit/>
+          </a:bodyPr>
+          <a:lstStyle/>
+          <a:p>
             <a:r>
-              <a:rPr lang="en-US" dirty="0" smtClean="0">
+              <a:rPr lang="en-US" b="1" dirty="0" smtClean="0">
                 <a:solidFill>
                   <a:schemeClr val="bg1">
-                    <a:lumMod val="85000"/>
+                    <a:lumMod val="75000"/>
                   </a:schemeClr>
                 </a:solidFill>
               </a:rPr>
-              <a:t>excluding</a:t>
+              <a:t>13</a:t>
             </a:r>
-          </a:p>
-          <a:p>
-            <a:pPr algn="ctr"/>
-            <a:r>
-              <a:rPr lang="en-US" dirty="0" smtClean="0">
-                <a:solidFill>
-                  <a:schemeClr val="bg1">
-                    <a:lumMod val="85000"/>
-                  </a:schemeClr>
-                </a:solidFill>
-              </a:rPr>
-              <a:t>Bob</a:t>
-            </a:r>
-            <a:endParaRPr lang="hy-AM" dirty="0">
+            <a:endParaRPr lang="hy-AM" b="1" dirty="0">
               <a:solidFill>
                 <a:schemeClr val="bg1">
-                  <a:lumMod val="85000"/>
+                  <a:lumMod val="75000"/>
                 </a:schemeClr>
               </a:solidFill>
             </a:endParaRPr>
@@ -33611,6 +34025,48 @@
           </a:p>
         </p:txBody>
       </p:sp>
+      <p:sp>
+        <p:nvSpPr>
+          <p:cNvPr id="85" name="TextBox 84"/>
+          <p:cNvSpPr txBox="1"/>
+          <p:nvPr/>
+        </p:nvSpPr>
+        <p:spPr>
+          <a:xfrm>
+            <a:off x="8644271" y="6508430"/>
+            <a:ext cx="380254" cy="307777"/>
+          </a:xfrm>
+          <a:prstGeom prst="rect">
+            <a:avLst/>
+          </a:prstGeom>
+          <a:noFill/>
+        </p:spPr>
+        <p:txBody>
+          <a:bodyPr wrap="square" rtlCol="0">
+            <a:spAutoFit/>
+          </a:bodyPr>
+          <a:lstStyle/>
+          <a:p>
+            <a:r>
+              <a:rPr lang="en-US" b="1" dirty="0" smtClean="0">
+                <a:solidFill>
+                  <a:schemeClr val="bg1">
+                    <a:lumMod val="75000"/>
+                  </a:schemeClr>
+                </a:solidFill>
+              </a:rPr>
+              <a:t>14</a:t>
+            </a:r>
+            <a:endParaRPr lang="hy-AM" b="1" dirty="0">
+              <a:solidFill>
+                <a:schemeClr val="bg1">
+                  <a:lumMod val="75000"/>
+                </a:schemeClr>
+              </a:solidFill>
+            </a:endParaRPr>
+          </a:p>
+        </p:txBody>
+      </p:sp>
     </p:spTree>
     <p:extLst>
       <p:ext uri="{BB962C8B-B14F-4D97-AF65-F5344CB8AC3E}">
@@ -33880,6 +34336,48 @@
               <a:buChar char="§"/>
             </a:pPr>
             <a:endParaRPr lang="hy-AM" sz="2000" dirty="0"/>
+          </a:p>
+        </p:txBody>
+      </p:sp>
+      <p:sp>
+        <p:nvSpPr>
+          <p:cNvPr id="5" name="TextBox 4"/>
+          <p:cNvSpPr txBox="1"/>
+          <p:nvPr/>
+        </p:nvSpPr>
+        <p:spPr>
+          <a:xfrm>
+            <a:off x="8644271" y="6508430"/>
+            <a:ext cx="380254" cy="307777"/>
+          </a:xfrm>
+          <a:prstGeom prst="rect">
+            <a:avLst/>
+          </a:prstGeom>
+          <a:noFill/>
+        </p:spPr>
+        <p:txBody>
+          <a:bodyPr wrap="square" rtlCol="0">
+            <a:spAutoFit/>
+          </a:bodyPr>
+          <a:lstStyle/>
+          <a:p>
+            <a:r>
+              <a:rPr lang="en-US" b="1" dirty="0" smtClean="0">
+                <a:solidFill>
+                  <a:schemeClr val="bg1">
+                    <a:lumMod val="75000"/>
+                  </a:schemeClr>
+                </a:solidFill>
+              </a:rPr>
+              <a:t>15</a:t>
+            </a:r>
+            <a:endParaRPr lang="hy-AM" b="1" dirty="0">
+              <a:solidFill>
+                <a:schemeClr val="bg1">
+                  <a:lumMod val="75000"/>
+                </a:schemeClr>
+              </a:solidFill>
+            </a:endParaRPr>
           </a:p>
         </p:txBody>
       </p:sp>
@@ -33950,7 +34448,7 @@
         <p:spPr>
           <a:xfrm>
             <a:off x="1165475" y="1381056"/>
-            <a:ext cx="7861567" cy="4893647"/>
+            <a:ext cx="7861567" cy="5109091"/>
           </a:xfrm>
           <a:prstGeom prst="rect">
             <a:avLst/>
@@ -34315,15 +34813,6 @@
             </a:endParaRPr>
           </a:p>
           <a:p>
-            <a:endParaRPr lang="en-US" sz="1600" dirty="0" smtClean="0">
-              <a:solidFill>
-                <a:schemeClr val="bg1">
-                  <a:lumMod val="95000"/>
-                </a:schemeClr>
-              </a:solidFill>
-            </a:endParaRPr>
-          </a:p>
-          <a:p>
             <a:endParaRPr lang="en-US" sz="1600" dirty="0">
               <a:solidFill>
                 <a:schemeClr val="bg1">
@@ -34333,6 +34822,78 @@
             </a:endParaRPr>
           </a:p>
           <a:p>
+            <a:r>
+              <a:rPr lang="en-US" dirty="0" smtClean="0">
+                <a:solidFill>
+                  <a:schemeClr val="bg1">
+                    <a:lumMod val="85000"/>
+                  </a:schemeClr>
+                </a:solidFill>
+              </a:rPr>
+              <a:t>Paper Presented: </a:t>
+            </a:r>
+            <a:r>
+              <a:rPr lang="en-US" dirty="0">
+                <a:solidFill>
+                  <a:schemeClr val="accent1">
+                    <a:lumMod val="75000"/>
+                  </a:schemeClr>
+                </a:solidFill>
+              </a:rPr>
+              <a:t>Reza Shokri &amp;</a:t>
+            </a:r>
+            <a:r>
+              <a:rPr lang="en-US" dirty="0" smtClean="0">
+                <a:solidFill>
+                  <a:schemeClr val="accent1">
+                    <a:lumMod val="75000"/>
+                  </a:schemeClr>
+                </a:solidFill>
+              </a:rPr>
+              <a:t> </a:t>
+            </a:r>
+            <a:r>
+              <a:rPr lang="en-US" dirty="0">
+                <a:solidFill>
+                  <a:schemeClr val="accent1">
+                    <a:lumMod val="75000"/>
+                  </a:schemeClr>
+                </a:solidFill>
+              </a:rPr>
+              <a:t>Vitaly Shmatikov. </a:t>
+            </a:r>
+            <a:r>
+              <a:rPr lang="en-US" dirty="0" smtClean="0">
+                <a:solidFill>
+                  <a:schemeClr val="accent1">
+                    <a:lumMod val="75000"/>
+                  </a:schemeClr>
+                </a:solidFill>
+              </a:rPr>
+              <a:t>Privacy-Preserving </a:t>
+            </a:r>
+            <a:r>
+              <a:rPr lang="en-US" dirty="0">
+                <a:solidFill>
+                  <a:schemeClr val="accent1">
+                    <a:lumMod val="75000"/>
+                  </a:schemeClr>
+                </a:solidFill>
+              </a:rPr>
+              <a:t>Deep Learning. </a:t>
+            </a:r>
+            <a:r>
+              <a:rPr lang="en-US" dirty="0" smtClean="0">
+                <a:solidFill>
+                  <a:schemeClr val="accent1">
+                    <a:lumMod val="75000"/>
+                  </a:schemeClr>
+                </a:solidFill>
+              </a:rPr>
+              <a:t>CCS '15. </a:t>
+            </a:r>
+          </a:p>
+          <a:p>
             <a:endParaRPr lang="en-US" sz="1600" dirty="0">
               <a:solidFill>
                 <a:schemeClr val="bg1">
@@ -34342,6 +34903,15 @@
             </a:endParaRPr>
           </a:p>
           <a:p>
+            <a:endParaRPr lang="en-US" sz="1600" dirty="0">
+              <a:solidFill>
+                <a:schemeClr val="bg1">
+                  <a:lumMod val="95000"/>
+                </a:schemeClr>
+              </a:solidFill>
+            </a:endParaRPr>
+          </a:p>
+          <a:p>
             <a:endParaRPr lang="en-US" dirty="0"/>
           </a:p>
           <a:p>
@@ -34352,6 +34922,48 @@
           </a:p>
           <a:p>
             <a:endParaRPr lang="hy-AM" dirty="0"/>
+          </a:p>
+        </p:txBody>
+      </p:sp>
+      <p:sp>
+        <p:nvSpPr>
+          <p:cNvPr id="4" name="TextBox 3"/>
+          <p:cNvSpPr txBox="1"/>
+          <p:nvPr/>
+        </p:nvSpPr>
+        <p:spPr>
+          <a:xfrm>
+            <a:off x="8644271" y="6508430"/>
+            <a:ext cx="380254" cy="307777"/>
+          </a:xfrm>
+          <a:prstGeom prst="rect">
+            <a:avLst/>
+          </a:prstGeom>
+          <a:noFill/>
+        </p:spPr>
+        <p:txBody>
+          <a:bodyPr wrap="square" rtlCol="0">
+            <a:spAutoFit/>
+          </a:bodyPr>
+          <a:lstStyle/>
+          <a:p>
+            <a:r>
+              <a:rPr lang="en-US" b="1" dirty="0" smtClean="0">
+                <a:solidFill>
+                  <a:schemeClr val="bg1">
+                    <a:lumMod val="75000"/>
+                  </a:schemeClr>
+                </a:solidFill>
+              </a:rPr>
+              <a:t>16</a:t>
+            </a:r>
+            <a:endParaRPr lang="hy-AM" b="1" dirty="0">
+              <a:solidFill>
+                <a:schemeClr val="bg1">
+                  <a:lumMod val="75000"/>
+                </a:schemeClr>
+              </a:solidFill>
+            </a:endParaRPr>
           </a:p>
         </p:txBody>
       </p:sp>
@@ -34412,8 +35024,8 @@
         </p:nvSpPr>
         <p:spPr>
           <a:xfrm>
-            <a:off x="1336100" y="1679850"/>
-            <a:ext cx="7337699" cy="1546500"/>
+            <a:off x="1336100" y="3105619"/>
+            <a:ext cx="7337699" cy="568210"/>
           </a:xfrm>
           <a:prstGeom prst="rect">
             <a:avLst/>
@@ -34456,7 +35068,7 @@
         </p:nvSpPr>
         <p:spPr>
           <a:xfrm>
-            <a:off x="1336099" y="3151922"/>
+            <a:off x="1336100" y="3821774"/>
             <a:ext cx="7337699" cy="812700"/>
           </a:xfrm>
           <a:prstGeom prst="rect">
@@ -34494,8 +35106,8 @@
         </p:nvSpPr>
         <p:spPr>
           <a:xfrm>
-            <a:off x="382772" y="1356684"/>
-            <a:ext cx="8484782" cy="1477328"/>
+            <a:off x="350868" y="723964"/>
+            <a:ext cx="8484782" cy="2031325"/>
           </a:xfrm>
           <a:prstGeom prst="rect">
             <a:avLst/>
@@ -34508,33 +35120,89 @@
           </a:bodyPr>
           <a:lstStyle/>
           <a:p>
+            <a:pPr algn="just">
+              <a:lnSpc>
+                <a:spcPct val="150000"/>
+              </a:lnSpc>
+            </a:pPr>
             <a:r>
-              <a:rPr lang="en-US" sz="1800" dirty="0" smtClean="0">
+              <a:rPr lang="en-US" sz="2000" dirty="0" smtClean="0">
                 <a:solidFill>
                   <a:schemeClr val="bg1">
                     <a:lumMod val="95000"/>
                   </a:schemeClr>
                 </a:solidFill>
-                <a:latin typeface="Avenir Book" charset="0"/>
-                <a:ea typeface="Avenir Book" charset="0"/>
-                <a:cs typeface="Avenir Book" charset="0"/>
+                <a:latin typeface="Cooper Black" charset="0"/>
+                <a:ea typeface="Cooper Black" charset="0"/>
+                <a:cs typeface="Cooper Black" charset="0"/>
               </a:rPr>
-              <a:t>“We “learn” some parameters from everyone who passes through our lives. Some parameters train our life models in a better way, some the contrary. </a:t>
+              <a:t>“</a:t>
             </a:r>
-          </a:p>
-          <a:p>
             <a:r>
-              <a:rPr lang="en-US" sz="1800" dirty="0" smtClean="0">
+              <a:rPr lang="en-US" sz="2000" dirty="0" smtClean="0">
                 <a:solidFill>
                   <a:schemeClr val="bg1">
                     <a:lumMod val="95000"/>
                   </a:schemeClr>
                 </a:solidFill>
-                <a:latin typeface="Avenir Book" charset="0"/>
-                <a:ea typeface="Avenir Book" charset="0"/>
-                <a:cs typeface="Avenir Book" charset="0"/>
+                <a:latin typeface="Apple Chancery" charset="0"/>
+                <a:ea typeface="Apple Chancery" charset="0"/>
+                <a:cs typeface="Apple Chancery" charset="0"/>
               </a:rPr>
-              <a:t>However, they all ensure that one achieves a fulfilled life (global convergence).</a:t>
+              <a:t>We learn some parameters from everyone who passes through our lives. </a:t>
+            </a:r>
+          </a:p>
+          <a:p>
+            <a:pPr algn="just">
+              <a:lnSpc>
+                <a:spcPct val="150000"/>
+              </a:lnSpc>
+            </a:pPr>
+            <a:r>
+              <a:rPr lang="en-US" sz="2000" dirty="0" smtClean="0">
+                <a:solidFill>
+                  <a:schemeClr val="bg1">
+                    <a:lumMod val="95000"/>
+                  </a:schemeClr>
+                </a:solidFill>
+                <a:latin typeface="Apple Chancery" charset="0"/>
+                <a:ea typeface="Apple Chancery" charset="0"/>
+                <a:cs typeface="Apple Chancery" charset="0"/>
+              </a:rPr>
+              <a:t>Some parameters train our life models in a better way, some the contrary.</a:t>
+            </a:r>
+          </a:p>
+          <a:p>
+            <a:pPr algn="just">
+              <a:lnSpc>
+                <a:spcPct val="150000"/>
+              </a:lnSpc>
+            </a:pPr>
+            <a:r>
+              <a:rPr lang="en-US" sz="2000" dirty="0" smtClean="0">
+                <a:solidFill>
+                  <a:schemeClr val="bg1">
+                    <a:lumMod val="95000"/>
+                  </a:schemeClr>
+                </a:solidFill>
+                <a:latin typeface="Apple Chancery" charset="0"/>
+                <a:ea typeface="Apple Chancery" charset="0"/>
+                <a:cs typeface="Apple Chancery" charset="0"/>
+              </a:rPr>
+              <a:t>However, they all ensure that one achieves a fulfilled life (global convergence)</a:t>
+            </a:r>
+            <a:r>
+              <a:rPr lang="en-US" sz="2000" dirty="0" smtClean="0">
+                <a:solidFill>
+                  <a:schemeClr val="bg1">
+                    <a:lumMod val="95000"/>
+                  </a:schemeClr>
+                </a:solidFill>
+                <a:latin typeface="Cooper Black" charset="0"/>
+                <a:ea typeface="Cooper Black" charset="0"/>
+                <a:cs typeface="Cooper Black" charset="0"/>
+              </a:rPr>
+              <a:t>”</a:t>
             </a:r>
           </a:p>
           <a:p>
@@ -34600,7 +35268,7 @@
                 <a:ea typeface="Avenir Book" charset="0"/>
                 <a:cs typeface="Avenir Book" charset="0"/>
               </a:rPr>
-              <a:t>	          -  Vaibhav Kulkarni</a:t>
+              <a:t>	</a:t>
             </a:r>
             <a:endParaRPr lang="hy-AM" sz="1800" dirty="0">
               <a:solidFill>
@@ -34608,9 +35276,9 @@
                   <a:lumMod val="95000"/>
                 </a:schemeClr>
               </a:solidFill>
-              <a:latin typeface="Avenir Book" charset="0"/>
-              <a:ea typeface="Avenir Book" charset="0"/>
-              <a:cs typeface="Avenir Book" charset="0"/>
+              <a:latin typeface="Apple Chancery" charset="0"/>
+              <a:ea typeface="Apple Chancery" charset="0"/>
+              <a:cs typeface="Apple Chancery" charset="0"/>
             </a:endParaRPr>
           </a:p>
         </p:txBody>
@@ -35927,6 +36595,48 @@
           </a:fontRef>
         </p:style>
       </p:cxnSp>
+      <p:sp>
+        <p:nvSpPr>
+          <p:cNvPr id="2" name="TextBox 1"/>
+          <p:cNvSpPr txBox="1"/>
+          <p:nvPr/>
+        </p:nvSpPr>
+        <p:spPr>
+          <a:xfrm>
+            <a:off x="8770711" y="6508430"/>
+            <a:ext cx="253813" cy="307777"/>
+          </a:xfrm>
+          <a:prstGeom prst="rect">
+            <a:avLst/>
+          </a:prstGeom>
+          <a:noFill/>
+        </p:spPr>
+        <p:txBody>
+          <a:bodyPr wrap="square" rtlCol="0">
+            <a:spAutoFit/>
+          </a:bodyPr>
+          <a:lstStyle/>
+          <a:p>
+            <a:r>
+              <a:rPr lang="en-US" b="1" dirty="0" smtClean="0">
+                <a:solidFill>
+                  <a:schemeClr val="bg1">
+                    <a:lumMod val="75000"/>
+                  </a:schemeClr>
+                </a:solidFill>
+              </a:rPr>
+              <a:t>1</a:t>
+            </a:r>
+            <a:endParaRPr lang="hy-AM" b="1" dirty="0">
+              <a:solidFill>
+                <a:schemeClr val="bg1">
+                  <a:lumMod val="75000"/>
+                </a:schemeClr>
+              </a:solidFill>
+            </a:endParaRPr>
+          </a:p>
+        </p:txBody>
+      </p:sp>
     </p:spTree>
   </p:cSld>
   <p:clrMapOvr>
@@ -37206,36 +37916,48 @@
           </a:prstGeom>
         </p:spPr>
       </p:pic>
-      <p:pic>
-        <p:nvPicPr>
-          <p:cNvPr id="21" name="Picture 20"/>
-          <p:cNvPicPr>
-            <a:picLocks noChangeAspect="1"/>
-          </p:cNvPicPr>
-          <p:nvPr/>
-        </p:nvPicPr>
-        <p:blipFill>
-          <a:blip r:embed="rId9">
-            <a:extLst>
-              <a:ext uri="{28A0092B-C50C-407E-A947-70E740481C1C}">
-                <a14:useLocalDpi xmlns:a14="http://schemas.microsoft.com/office/drawing/2010/main" val="0"/>
-              </a:ext>
-            </a:extLst>
-          </a:blip>
-          <a:stretch>
-            <a:fillRect/>
-          </a:stretch>
-        </p:blipFill>
+      <p:sp>
+        <p:nvSpPr>
+          <p:cNvPr id="10" name="TextBox 9"/>
+          <p:cNvSpPr txBox="1"/>
+          <p:nvPr/>
+        </p:nvSpPr>
         <p:spPr>
           <a:xfrm>
-            <a:off x="2899209" y="1676384"/>
-            <a:ext cx="4286250" cy="3467100"/>
+            <a:off x="8770711" y="6508430"/>
+            <a:ext cx="253813" cy="307777"/>
           </a:xfrm>
           <a:prstGeom prst="rect">
             <a:avLst/>
           </a:prstGeom>
-        </p:spPr>
-      </p:pic>
+          <a:noFill/>
+        </p:spPr>
+        <p:txBody>
+          <a:bodyPr wrap="square" rtlCol="0">
+            <a:spAutoFit/>
+          </a:bodyPr>
+          <a:lstStyle/>
+          <a:p>
+            <a:r>
+              <a:rPr lang="en-US" b="1" dirty="0">
+                <a:solidFill>
+                  <a:schemeClr val="bg1">
+                    <a:lumMod val="75000"/>
+                  </a:schemeClr>
+                </a:solidFill>
+              </a:rPr>
+              <a:t>2</a:t>
+            </a:r>
+            <a:endParaRPr lang="hy-AM" b="1" dirty="0">
+              <a:solidFill>
+                <a:schemeClr val="bg1">
+                  <a:lumMod val="75000"/>
+                </a:schemeClr>
+              </a:solidFill>
+            </a:endParaRPr>
+          </a:p>
+        </p:txBody>
+      </p:sp>
     </p:spTree>
     <p:extLst>
       <p:ext uri="{BB962C8B-B14F-4D97-AF65-F5344CB8AC3E}">
@@ -37545,59 +38267,6 @@
                                         <p:cTn id="30" dur="500"/>
                                         <p:tgtEl>
                                           <p:spTgt spid="17"/>
-                                        </p:tgtEl>
-                                      </p:cBhvr>
-                                    </p:animEffect>
-                                  </p:childTnLst>
-                                </p:cTn>
-                              </p:par>
-                            </p:childTnLst>
-                          </p:cTn>
-                        </p:par>
-                      </p:childTnLst>
-                    </p:cTn>
-                  </p:par>
-                  <p:par>
-                    <p:cTn id="31" fill="hold">
-                      <p:stCondLst>
-                        <p:cond delay="indefinite"/>
-                      </p:stCondLst>
-                      <p:childTnLst>
-                        <p:par>
-                          <p:cTn id="32" fill="hold">
-                            <p:stCondLst>
-                              <p:cond delay="0"/>
-                            </p:stCondLst>
-                            <p:childTnLst>
-                              <p:par>
-                                <p:cTn id="33" presetID="10" presetClass="entr" presetSubtype="0" fill="hold" nodeType="clickEffect">
-                                  <p:stCondLst>
-                                    <p:cond delay="0"/>
-                                  </p:stCondLst>
-                                  <p:childTnLst>
-                                    <p:set>
-                                      <p:cBhvr>
-                                        <p:cTn id="34" dur="1" fill="hold">
-                                          <p:stCondLst>
-                                            <p:cond delay="0"/>
-                                          </p:stCondLst>
-                                        </p:cTn>
-                                        <p:tgtEl>
-                                          <p:spTgt spid="21"/>
-                                        </p:tgtEl>
-                                        <p:attrNameLst>
-                                          <p:attrName>style.visibility</p:attrName>
-                                        </p:attrNameLst>
-                                      </p:cBhvr>
-                                      <p:to>
-                                        <p:strVal val="visible"/>
-                                      </p:to>
-                                    </p:set>
-                                    <p:animEffect transition="in" filter="fade">
-                                      <p:cBhvr>
-                                        <p:cTn id="35" dur="500"/>
-                                        <p:tgtEl>
-                                          <p:spTgt spid="21"/>
                                         </p:tgtEl>
                                       </p:cBhvr>
                                     </p:animEffect>
@@ -38443,6 +39112,48 @@
           </a:prstGeom>
         </p:spPr>
       </p:pic>
+      <p:sp>
+        <p:nvSpPr>
+          <p:cNvPr id="20" name="TextBox 19"/>
+          <p:cNvSpPr txBox="1"/>
+          <p:nvPr/>
+        </p:nvSpPr>
+        <p:spPr>
+          <a:xfrm>
+            <a:off x="8770711" y="6508430"/>
+            <a:ext cx="253813" cy="307777"/>
+          </a:xfrm>
+          <a:prstGeom prst="rect">
+            <a:avLst/>
+          </a:prstGeom>
+          <a:noFill/>
+        </p:spPr>
+        <p:txBody>
+          <a:bodyPr wrap="square" rtlCol="0">
+            <a:spAutoFit/>
+          </a:bodyPr>
+          <a:lstStyle/>
+          <a:p>
+            <a:r>
+              <a:rPr lang="en-US" b="1" dirty="0">
+                <a:solidFill>
+                  <a:schemeClr val="bg1">
+                    <a:lumMod val="75000"/>
+                  </a:schemeClr>
+                </a:solidFill>
+              </a:rPr>
+              <a:t>3</a:t>
+            </a:r>
+            <a:endParaRPr lang="hy-AM" b="1" dirty="0">
+              <a:solidFill>
+                <a:schemeClr val="bg1">
+                  <a:lumMod val="75000"/>
+                </a:schemeClr>
+              </a:solidFill>
+            </a:endParaRPr>
+          </a:p>
+        </p:txBody>
+      </p:sp>
     </p:spTree>
     <p:extLst>
       <p:ext uri="{BB962C8B-B14F-4D97-AF65-F5344CB8AC3E}">
@@ -39548,6 +40259,48 @@
           </a:p>
         </p:txBody>
       </p:sp>
+      <p:sp>
+        <p:nvSpPr>
+          <p:cNvPr id="10" name="TextBox 9"/>
+          <p:cNvSpPr txBox="1"/>
+          <p:nvPr/>
+        </p:nvSpPr>
+        <p:spPr>
+          <a:xfrm>
+            <a:off x="8770711" y="6508430"/>
+            <a:ext cx="253813" cy="307777"/>
+          </a:xfrm>
+          <a:prstGeom prst="rect">
+            <a:avLst/>
+          </a:prstGeom>
+          <a:noFill/>
+        </p:spPr>
+        <p:txBody>
+          <a:bodyPr wrap="square" rtlCol="0">
+            <a:spAutoFit/>
+          </a:bodyPr>
+          <a:lstStyle/>
+          <a:p>
+            <a:r>
+              <a:rPr lang="en-US" b="1" dirty="0">
+                <a:solidFill>
+                  <a:schemeClr val="bg1">
+                    <a:lumMod val="75000"/>
+                  </a:schemeClr>
+                </a:solidFill>
+              </a:rPr>
+              <a:t>4</a:t>
+            </a:r>
+            <a:endParaRPr lang="hy-AM" b="1" dirty="0">
+              <a:solidFill>
+                <a:schemeClr val="bg1">
+                  <a:lumMod val="75000"/>
+                </a:schemeClr>
+              </a:solidFill>
+            </a:endParaRPr>
+          </a:p>
+        </p:txBody>
+      </p:sp>
     </p:spTree>
     <p:extLst>
       <p:ext uri="{BB962C8B-B14F-4D97-AF65-F5344CB8AC3E}">
@@ -40648,6 +41401,48 @@
           </a:fontRef>
         </p:style>
       </p:cxnSp>
+      <p:sp>
+        <p:nvSpPr>
+          <p:cNvPr id="18" name="TextBox 17"/>
+          <p:cNvSpPr txBox="1"/>
+          <p:nvPr/>
+        </p:nvSpPr>
+        <p:spPr>
+          <a:xfrm>
+            <a:off x="8770711" y="6508430"/>
+            <a:ext cx="253813" cy="307777"/>
+          </a:xfrm>
+          <a:prstGeom prst="rect">
+            <a:avLst/>
+          </a:prstGeom>
+          <a:noFill/>
+        </p:spPr>
+        <p:txBody>
+          <a:bodyPr wrap="square" rtlCol="0">
+            <a:spAutoFit/>
+          </a:bodyPr>
+          <a:lstStyle/>
+          <a:p>
+            <a:r>
+              <a:rPr lang="en-US" b="1" dirty="0">
+                <a:solidFill>
+                  <a:schemeClr val="bg1">
+                    <a:lumMod val="75000"/>
+                  </a:schemeClr>
+                </a:solidFill>
+              </a:rPr>
+              <a:t>5</a:t>
+            </a:r>
+            <a:endParaRPr lang="hy-AM" b="1" dirty="0">
+              <a:solidFill>
+                <a:schemeClr val="bg1">
+                  <a:lumMod val="75000"/>
+                </a:schemeClr>
+              </a:solidFill>
+            </a:endParaRPr>
+          </a:p>
+        </p:txBody>
+      </p:sp>
     </p:spTree>
   </p:cSld>
   <p:clrMapOvr>
@@ -42069,6 +42864,48 @@
               <a:solidFill>
                 <a:schemeClr val="bg1">
                   <a:lumMod val="95000"/>
+                </a:schemeClr>
+              </a:solidFill>
+            </a:endParaRPr>
+          </a:p>
+        </p:txBody>
+      </p:sp>
+      <p:sp>
+        <p:nvSpPr>
+          <p:cNvPr id="21" name="TextBox 20"/>
+          <p:cNvSpPr txBox="1"/>
+          <p:nvPr/>
+        </p:nvSpPr>
+        <p:spPr>
+          <a:xfrm>
+            <a:off x="8770711" y="6508430"/>
+            <a:ext cx="253813" cy="307777"/>
+          </a:xfrm>
+          <a:prstGeom prst="rect">
+            <a:avLst/>
+          </a:prstGeom>
+          <a:noFill/>
+        </p:spPr>
+        <p:txBody>
+          <a:bodyPr wrap="square" rtlCol="0">
+            <a:spAutoFit/>
+          </a:bodyPr>
+          <a:lstStyle/>
+          <a:p>
+            <a:r>
+              <a:rPr lang="en-US" b="1" dirty="0">
+                <a:solidFill>
+                  <a:schemeClr val="bg1">
+                    <a:lumMod val="75000"/>
+                  </a:schemeClr>
+                </a:solidFill>
+              </a:rPr>
+              <a:t>6</a:t>
+            </a:r>
+            <a:endParaRPr lang="hy-AM" b="1" dirty="0">
+              <a:solidFill>
+                <a:schemeClr val="bg1">
+                  <a:lumMod val="75000"/>
                 </a:schemeClr>
               </a:solidFill>
             </a:endParaRPr>
@@ -44711,6 +45548,48 @@
           </a:prstGeom>
         </p:spPr>
       </p:pic>
+      <p:sp>
+        <p:nvSpPr>
+          <p:cNvPr id="51" name="TextBox 50"/>
+          <p:cNvSpPr txBox="1"/>
+          <p:nvPr/>
+        </p:nvSpPr>
+        <p:spPr>
+          <a:xfrm>
+            <a:off x="8770711" y="6508430"/>
+            <a:ext cx="253813" cy="307777"/>
+          </a:xfrm>
+          <a:prstGeom prst="rect">
+            <a:avLst/>
+          </a:prstGeom>
+          <a:noFill/>
+        </p:spPr>
+        <p:txBody>
+          <a:bodyPr wrap="square" rtlCol="0">
+            <a:spAutoFit/>
+          </a:bodyPr>
+          <a:lstStyle/>
+          <a:p>
+            <a:r>
+              <a:rPr lang="en-US" b="1" dirty="0">
+                <a:solidFill>
+                  <a:schemeClr val="bg1">
+                    <a:lumMod val="75000"/>
+                  </a:schemeClr>
+                </a:solidFill>
+              </a:rPr>
+              <a:t>7</a:t>
+            </a:r>
+            <a:endParaRPr lang="hy-AM" b="1" dirty="0">
+              <a:solidFill>
+                <a:schemeClr val="bg1">
+                  <a:lumMod val="75000"/>
+                </a:schemeClr>
+              </a:solidFill>
+            </a:endParaRPr>
+          </a:p>
+        </p:txBody>
+      </p:sp>
     </p:spTree>
     <p:extLst>
       <p:ext uri="{BB962C8B-B14F-4D97-AF65-F5344CB8AC3E}">

</xml_diff>